<commit_message>
Checked in files related to the reviewer's comments
</commit_message>
<xml_diff>
--- a/Project3_Securing-Recipe-Vaut-Web-Application/Project03_Deliverables/DevOpsPipeline.pptx
+++ b/Project3_Securing-Recipe-Vaut-Web-Application/Project03_Deliverables/DevOpsPipeline.pptx
@@ -5791,10 +5791,10 @@
               <a:buNone/>
             </a:pPr>
             <a:r>
-              <a:rPr lang="en" sz="1000"/>
+              <a:rPr lang="en" sz="1000" dirty="0"/>
               <a:t>Deploy cloud configuration or application to environment</a:t>
             </a:r>
-            <a:endParaRPr sz="1000"/>
+            <a:endParaRPr sz="1000" dirty="0"/>
           </a:p>
         </p:txBody>
       </p:sp>
@@ -6197,6 +6197,78 @@
           </a:p>
         </p:txBody>
       </p:sp>
+      <p:sp>
+        <p:nvSpPr>
+          <p:cNvPr id="13" name="Google Shape;55;p13"/>
+          <p:cNvSpPr/>
+          <p:nvPr/>
+        </p:nvSpPr>
+        <p:spPr>
+          <a:xfrm>
+            <a:off x="6746807" y="401406"/>
+            <a:ext cx="1666500" cy="597600"/>
+          </a:xfrm>
+          <a:prstGeom prst="rect">
+            <a:avLst/>
+          </a:prstGeom>
+          <a:solidFill>
+            <a:srgbClr val="CFE2F3"/>
+          </a:solidFill>
+          <a:ln>
+            <a:noFill/>
+          </a:ln>
+        </p:spPr>
+        <p:txBody>
+          <a:bodyPr spcFirstLastPara="1" wrap="square" lIns="91425" tIns="91425" rIns="91425" bIns="91425" anchor="ctr" anchorCtr="0">
+            <a:noAutofit/>
+          </a:bodyPr>
+          <a:lstStyle/>
+          <a:p>
+            <a:pPr marL="0" lvl="0" indent="0" algn="ctr" rtl="0">
+              <a:spcBef>
+                <a:spcPts val="0"/>
+              </a:spcBef>
+              <a:spcAft>
+                <a:spcPts val="0"/>
+              </a:spcAft>
+              <a:buNone/>
+            </a:pPr>
+            <a:r>
+              <a:rPr lang="en" sz="1000" dirty="0" smtClean="0"/>
+              <a:t>Post Deployment Compliance Scanning</a:t>
+            </a:r>
+            <a:endParaRPr sz="1000" dirty="0"/>
+          </a:p>
+        </p:txBody>
+      </p:sp>
+      <p:cxnSp>
+        <p:nvCxnSpPr>
+          <p:cNvPr id="14" name="Google Shape;62;p13"/>
+          <p:cNvCxnSpPr/>
+          <p:nvPr/>
+        </p:nvCxnSpPr>
+        <p:spPr>
+          <a:xfrm rot="5400000" flipH="1" flipV="1">
+            <a:off x="7336619" y="1242419"/>
+            <a:ext cx="499576" cy="12700"/>
+          </a:xfrm>
+          <a:prstGeom prst="bentConnector3">
+            <a:avLst>
+              <a:gd name="adj1" fmla="val 50000"/>
+            </a:avLst>
+          </a:prstGeom>
+          <a:noFill/>
+          <a:ln w="9525" cap="flat" cmpd="sng">
+            <a:solidFill>
+              <a:schemeClr val="dk2"/>
+            </a:solidFill>
+            <a:prstDash val="solid"/>
+            <a:round/>
+            <a:headEnd type="none" w="med" len="med"/>
+            <a:tailEnd type="triangle" w="med" len="med"/>
+          </a:ln>
+        </p:spPr>
+      </p:cxnSp>
     </p:spTree>
   </p:cSld>
   <p:clrMapOvr>
@@ -6462,6 +6534,80 @@
           </a:prstGeom>
         </p:spPr>
       </p:pic>
+      <p:sp>
+        <p:nvSpPr>
+          <p:cNvPr id="8" name="Google Shape;55;p13"/>
+          <p:cNvSpPr/>
+          <p:nvPr/>
+        </p:nvSpPr>
+        <p:spPr>
+          <a:xfrm>
+            <a:off x="7529206" y="3827834"/>
+            <a:ext cx="1214839" cy="495140"/>
+          </a:xfrm>
+          <a:prstGeom prst="rect">
+            <a:avLst/>
+          </a:prstGeom>
+          <a:solidFill>
+            <a:srgbClr val="0070C0"/>
+          </a:solidFill>
+          <a:ln>
+            <a:noFill/>
+          </a:ln>
+        </p:spPr>
+        <p:txBody>
+          <a:bodyPr spcFirstLastPara="1" wrap="square" lIns="91425" tIns="91425" rIns="91425" bIns="91425" anchor="ctr" anchorCtr="0">
+            <a:noAutofit/>
+          </a:bodyPr>
+          <a:lstStyle/>
+          <a:p>
+            <a:pPr marL="0" lvl="0" indent="0" algn="ctr" rtl="0">
+              <a:spcBef>
+                <a:spcPts val="0"/>
+              </a:spcBef>
+              <a:spcAft>
+                <a:spcPts val="0"/>
+              </a:spcAft>
+              <a:buNone/>
+            </a:pPr>
+            <a:r>
+              <a:rPr lang="en" sz="1000" dirty="0" smtClean="0"/>
+              <a:t>Post Deployment Compliance Scanning</a:t>
+            </a:r>
+            <a:endParaRPr sz="1000" dirty="0"/>
+          </a:p>
+        </p:txBody>
+      </p:sp>
+      <p:cxnSp>
+        <p:nvCxnSpPr>
+          <p:cNvPr id="9" name="Google Shape;62;p13"/>
+          <p:cNvCxnSpPr>
+            <a:endCxn id="8" idx="0"/>
+          </p:cNvCxnSpPr>
+          <p:nvPr/>
+        </p:nvCxnSpPr>
+        <p:spPr>
+          <a:xfrm rot="16200000" flipH="1">
+            <a:off x="7869399" y="3560607"/>
+            <a:ext cx="530154" cy="4300"/>
+          </a:xfrm>
+          <a:prstGeom prst="bentConnector3">
+            <a:avLst>
+              <a:gd name="adj1" fmla="val 50000"/>
+            </a:avLst>
+          </a:prstGeom>
+          <a:noFill/>
+          <a:ln w="9525" cap="flat" cmpd="sng">
+            <a:solidFill>
+              <a:srgbClr val="002060"/>
+            </a:solidFill>
+            <a:prstDash val="solid"/>
+            <a:round/>
+            <a:headEnd type="none" w="med" len="med"/>
+            <a:tailEnd type="triangle" w="med" len="med"/>
+          </a:ln>
+        </p:spPr>
+      </p:cxnSp>
     </p:spTree>
     <p:extLst>
       <p:ext uri="{BB962C8B-B14F-4D97-AF65-F5344CB8AC3E}">

</xml_diff>